<commit_message>
typ klar med prototyp PP
</commit_message>
<xml_diff>
--- a/Procedurell_Generering_Utvardering.pptx
+++ b/Procedurell_Generering_Utvardering.pptx
@@ -3380,8 +3380,12 @@
           <a:lstStyle/>
           <a:p>
             <a:r>
+              <a:rPr lang="sv-SE" dirty="0" err="1"/>
+              <a:t>Procedurell</a:t>
+            </a:r>
+            <a:r>
               <a:rPr lang="sv-SE"/>
-              <a:t>Procedurell: </a:t>
+              <a:t> Generering: </a:t>
             </a:r>
             <a:r>
               <a:rPr lang="sv-SE" dirty="0"/>

</xml_diff>